<commit_message>
adding app link in readme
</commit_message>
<xml_diff>
--- a/REPORT AND PRESENTATION/BREAST CANCER DETECTION AND ANALYSIS.pptx
+++ b/REPORT AND PRESENTATION/BREAST CANCER DETECTION AND ANALYSIS.pptx
@@ -127,6 +127,11 @@
       </a:defRPr>
     </a:lvl9pPr>
   </p:defaultTextStyle>
+  <p:extLst>
+    <p:ext uri="{EFAFB233-063F-42B5-8137-9DF3F51BA10A}">
+      <p15:sldGuideLst xmlns:p15="http://schemas.microsoft.com/office/powerpoint/2012/main"/>
+    </p:ext>
+  </p:extLst>
 </p:presentation>
 </file>
 
@@ -879,7 +884,7 @@
             <a:fld id="{B61BEF0D-F0BB-DE4B-95CE-6DB70DBA9567}" type="datetimeFigureOut">
               <a:rPr lang="en-US" dirty="0"/>
               <a:pPr/>
-              <a:t>8/18/2017</a:t>
+              <a:t>8/19/2017</a:t>
             </a:fld>
             <a:endParaRPr lang="en-US" dirty="0"/>
           </a:p>
@@ -1127,7 +1132,7 @@
             <a:fld id="{B61BEF0D-F0BB-DE4B-95CE-6DB70DBA9567}" type="datetimeFigureOut">
               <a:rPr lang="en-US" dirty="0"/>
               <a:pPr/>
-              <a:t>8/18/2017</a:t>
+              <a:t>8/19/2017</a:t>
             </a:fld>
             <a:endParaRPr lang="en-US" dirty="0"/>
           </a:p>
@@ -1438,7 +1443,7 @@
             <a:fld id="{B61BEF0D-F0BB-DE4B-95CE-6DB70DBA9567}" type="datetimeFigureOut">
               <a:rPr lang="en-US" dirty="0"/>
               <a:pPr/>
-              <a:t>8/18/2017</a:t>
+              <a:t>8/19/2017</a:t>
             </a:fld>
             <a:endParaRPr lang="en-US" dirty="0"/>
           </a:p>
@@ -1776,7 +1781,7 @@
             <a:fld id="{B61BEF0D-F0BB-DE4B-95CE-6DB70DBA9567}" type="datetimeFigureOut">
               <a:rPr lang="en-US" dirty="0"/>
               <a:pPr/>
-              <a:t>8/18/2017</a:t>
+              <a:t>8/19/2017</a:t>
             </a:fld>
             <a:endParaRPr lang="en-US" dirty="0"/>
           </a:p>
@@ -2087,7 +2092,7 @@
             <a:fld id="{B61BEF0D-F0BB-DE4B-95CE-6DB70DBA9567}" type="datetimeFigureOut">
               <a:rPr lang="en-US" dirty="0"/>
               <a:pPr/>
-              <a:t>8/18/2017</a:t>
+              <a:t>8/19/2017</a:t>
             </a:fld>
             <a:endParaRPr lang="en-US" dirty="0"/>
           </a:p>
@@ -2477,7 +2482,7 @@
             <a:fld id="{B61BEF0D-F0BB-DE4B-95CE-6DB70DBA9567}" type="datetimeFigureOut">
               <a:rPr lang="en-US" dirty="0"/>
               <a:pPr/>
-              <a:t>8/18/2017</a:t>
+              <a:t>8/19/2017</a:t>
             </a:fld>
             <a:endParaRPr lang="en-US" dirty="0"/>
           </a:p>
@@ -2643,7 +2648,7 @@
           <a:p>
             <a:fld id="{55C6B4A9-1611-4792-9094-5F34BCA07E0B}" type="datetimeFigureOut">
               <a:rPr lang="en-US" dirty="0"/>
-              <a:t>8/18/2017</a:t>
+              <a:t>8/19/2017</a:t>
             </a:fld>
             <a:endParaRPr lang="en-US" dirty="0"/>
           </a:p>
@@ -2819,7 +2824,7 @@
             <a:fld id="{B61BEF0D-F0BB-DE4B-95CE-6DB70DBA9567}" type="datetimeFigureOut">
               <a:rPr lang="en-US" dirty="0"/>
               <a:pPr/>
-              <a:t>8/18/2017</a:t>
+              <a:t>8/19/2017</a:t>
             </a:fld>
             <a:endParaRPr lang="en-US" dirty="0"/>
           </a:p>
@@ -2992,7 +2997,7 @@
             <a:fld id="{B61BEF0D-F0BB-DE4B-95CE-6DB70DBA9567}" type="datetimeFigureOut">
               <a:rPr lang="en-US" dirty="0"/>
               <a:pPr/>
-              <a:t>8/18/2017</a:t>
+              <a:t>8/19/2017</a:t>
             </a:fld>
             <a:endParaRPr lang="en-US" dirty="0"/>
           </a:p>
@@ -3236,7 +3241,7 @@
             <a:fld id="{B61BEF0D-F0BB-DE4B-95CE-6DB70DBA9567}" type="datetimeFigureOut">
               <a:rPr lang="en-US" dirty="0"/>
               <a:pPr/>
-              <a:t>8/18/2017</a:t>
+              <a:t>8/19/2017</a:t>
             </a:fld>
             <a:endParaRPr lang="en-US" dirty="0"/>
           </a:p>
@@ -3464,7 +3469,7 @@
           <a:p>
             <a:fld id="{EB712588-04B1-427B-82EE-E8DB90309F08}" type="datetimeFigureOut">
               <a:rPr lang="en-US" dirty="0"/>
-              <a:t>8/18/2017</a:t>
+              <a:t>8/19/2017</a:t>
             </a:fld>
             <a:endParaRPr lang="en-US" dirty="0"/>
           </a:p>
@@ -3834,7 +3839,7 @@
             <a:fld id="{B61BEF0D-F0BB-DE4B-95CE-6DB70DBA9567}" type="datetimeFigureOut">
               <a:rPr lang="en-US" dirty="0"/>
               <a:pPr/>
-              <a:t>8/18/2017</a:t>
+              <a:t>8/19/2017</a:t>
             </a:fld>
             <a:endParaRPr lang="en-US" dirty="0"/>
           </a:p>
@@ -3954,7 +3959,7 @@
             <a:fld id="{B61BEF0D-F0BB-DE4B-95CE-6DB70DBA9567}" type="datetimeFigureOut">
               <a:rPr lang="en-US" dirty="0"/>
               <a:pPr/>
-              <a:t>8/18/2017</a:t>
+              <a:t>8/19/2017</a:t>
             </a:fld>
             <a:endParaRPr lang="en-US" dirty="0"/>
           </a:p>
@@ -4046,7 +4051,7 @@
             <a:fld id="{B61BEF0D-F0BB-DE4B-95CE-6DB70DBA9567}" type="datetimeFigureOut">
               <a:rPr lang="en-US" dirty="0"/>
               <a:pPr/>
-              <a:t>8/18/2017</a:t>
+              <a:t>8/19/2017</a:t>
             </a:fld>
             <a:endParaRPr lang="en-US" dirty="0"/>
           </a:p>
@@ -4297,7 +4302,7 @@
           <a:p>
             <a:fld id="{42A54C80-263E-416B-A8E0-580EDEADCBDC}" type="datetimeFigureOut">
               <a:rPr lang="en-US" dirty="0"/>
-              <a:t>8/18/2017</a:t>
+              <a:t>8/19/2017</a:t>
             </a:fld>
             <a:endParaRPr lang="en-US" dirty="0"/>
           </a:p>
@@ -4556,7 +4561,7 @@
             <a:fld id="{B61BEF0D-F0BB-DE4B-95CE-6DB70DBA9567}" type="datetimeFigureOut">
               <a:rPr lang="en-US" dirty="0"/>
               <a:pPr/>
-              <a:t>8/18/2017</a:t>
+              <a:t>8/19/2017</a:t>
             </a:fld>
             <a:endParaRPr lang="en-US" dirty="0"/>
           </a:p>
@@ -5296,7 +5301,7 @@
             <a:fld id="{B61BEF0D-F0BB-DE4B-95CE-6DB70DBA9567}" type="datetimeFigureOut">
               <a:rPr lang="en-US" dirty="0"/>
               <a:pPr/>
-              <a:t>8/18/2017</a:t>
+              <a:t>8/19/2017</a:t>
             </a:fld>
             <a:endParaRPr lang="en-US" dirty="0"/>
           </a:p>
@@ -5903,6 +5908,12 @@
           </a:p>
           <a:p>
             <a:pPr algn="ctr"/>
+            <a:r>
+              <a:rPr lang="en-US" u="sng">
+                <a:hlinkClick r:id="rId2"/>
+              </a:rPr>
+              <a:t>http://breastcancerassesment.mybluemix.net/</a:t>
+            </a:r>
             <a:endParaRPr lang="en-US" dirty="0">
               <a:solidFill>
                 <a:schemeClr val="accent5">
@@ -8182,7 +8193,6 @@
               <a:rPr lang="en-US" dirty="0"/>
               <a:t> will be able to classify what type of tumor is it based on classification model. </a:t>
             </a:r>
-            <a:endParaRPr lang="en-US" dirty="0"/>
           </a:p>
         </p:txBody>
       </p:sp>
@@ -8880,11 +8890,7 @@
           <a:p>
             <a:r>
               <a:rPr lang="en-US" dirty="0"/>
-              <a:t>Docker run </a:t>
-            </a:r>
-            <a:r>
-              <a:rPr lang="en-US" dirty="0"/>
-              <a:t>akil06/finalproject:image1.2</a:t>
+              <a:t>Docker run akil06/finalproject:image1.2</a:t>
             </a:r>
           </a:p>
           <a:p>
@@ -8892,7 +8898,6 @@
               <a:rPr lang="en-US" dirty="0"/>
               <a:t>Docker run akil06/finalproject:image2</a:t>
             </a:r>
-            <a:endParaRPr lang="en-US" dirty="0"/>
           </a:p>
         </p:txBody>
       </p:sp>

</xml_diff>